<commit_message>
adding some diagram and content
</commit_message>
<xml_diff>
--- a/Docs/Presentations/Slides/#5 design and subsystems.pptx
+++ b/Docs/Presentations/Slides/#5 design and subsystems.pptx
@@ -205,7 +205,7 @@
           <a:p>
             <a:fld id="{44E562D0-84FD-411E-8C3F-A36A948BC859}" type="datetimeFigureOut">
               <a:rPr lang="en-US" smtClean="0"/>
-              <a:t>6/5/2017</a:t>
+              <a:t>6/6/2017</a:t>
             </a:fld>
             <a:endParaRPr lang="en-US"/>
           </a:p>
@@ -370,7 +370,7 @@
           <a:p>
             <a:fld id="{66175D2C-1B39-43F9-A837-A8832EDEE424}" type="datetimeFigureOut">
               <a:rPr lang="en-US" smtClean="0"/>
-              <a:t>6/5/2017</a:t>
+              <a:t>6/6/2017</a:t>
             </a:fld>
             <a:endParaRPr lang="en-US"/>
           </a:p>
@@ -1105,7 +1105,7 @@
           <a:p>
             <a:fld id="{A3262095-DDFB-454B-A6DA-90DBA20ABDC0}" type="datetime1">
               <a:rPr lang="en-US" smtClean="0"/>
-              <a:t>6/5/2017</a:t>
+              <a:t>6/6/2017</a:t>
             </a:fld>
             <a:endParaRPr lang="en-US"/>
           </a:p>
@@ -1275,7 +1275,7 @@
           <a:p>
             <a:fld id="{B5E7B701-CC3D-4513-A491-644406E6E0F3}" type="datetime1">
               <a:rPr lang="en-US" smtClean="0"/>
-              <a:t>6/5/2017</a:t>
+              <a:t>6/6/2017</a:t>
             </a:fld>
             <a:endParaRPr lang="en-US"/>
           </a:p>
@@ -1455,7 +1455,7 @@
           <a:p>
             <a:fld id="{06394014-7AF7-469C-99A4-D8404E64CDA7}" type="datetime1">
               <a:rPr lang="en-US" smtClean="0"/>
-              <a:t>6/5/2017</a:t>
+              <a:t>6/6/2017</a:t>
             </a:fld>
             <a:endParaRPr lang="en-US"/>
           </a:p>
@@ -1625,7 +1625,7 @@
           <a:p>
             <a:fld id="{F0E725F3-5DDC-43C9-9B04-B0DA72289B5F}" type="datetime1">
               <a:rPr lang="en-US" smtClean="0"/>
-              <a:t>6/5/2017</a:t>
+              <a:t>6/6/2017</a:t>
             </a:fld>
             <a:endParaRPr lang="en-US"/>
           </a:p>
@@ -1871,7 +1871,7 @@
           <a:p>
             <a:fld id="{EC13F56B-DA0B-4D08-9588-D2C5E58A8A05}" type="datetime1">
               <a:rPr lang="en-US" smtClean="0"/>
-              <a:t>6/5/2017</a:t>
+              <a:t>6/6/2017</a:t>
             </a:fld>
             <a:endParaRPr lang="en-US"/>
           </a:p>
@@ -2103,7 +2103,7 @@
           <a:p>
             <a:fld id="{299C329F-D0C2-462C-B78C-73BED02F6B3A}" type="datetime1">
               <a:rPr lang="en-US" smtClean="0"/>
-              <a:t>6/5/2017</a:t>
+              <a:t>6/6/2017</a:t>
             </a:fld>
             <a:endParaRPr lang="en-US"/>
           </a:p>
@@ -2470,7 +2470,7 @@
           <a:p>
             <a:fld id="{D9794D81-9A86-4611-8F90-73F29CC9E4B5}" type="datetime1">
               <a:rPr lang="en-US" smtClean="0"/>
-              <a:t>6/5/2017</a:t>
+              <a:t>6/6/2017</a:t>
             </a:fld>
             <a:endParaRPr lang="en-US"/>
           </a:p>
@@ -2588,7 +2588,7 @@
           <a:p>
             <a:fld id="{D68F34C9-1C3C-47F7-B45B-284099DAC214}" type="datetime1">
               <a:rPr lang="en-US" smtClean="0"/>
-              <a:t>6/5/2017</a:t>
+              <a:t>6/6/2017</a:t>
             </a:fld>
             <a:endParaRPr lang="en-US"/>
           </a:p>
@@ -2683,7 +2683,7 @@
           <a:p>
             <a:fld id="{1967B72D-8EFB-4381-8B1D-B7106AB7E466}" type="datetime1">
               <a:rPr lang="en-US" smtClean="0"/>
-              <a:t>6/5/2017</a:t>
+              <a:t>6/6/2017</a:t>
             </a:fld>
             <a:endParaRPr lang="en-US"/>
           </a:p>
@@ -2960,7 +2960,7 @@
           <a:p>
             <a:fld id="{5EDFAFED-D5AA-4784-B428-C75142A947D6}" type="datetime1">
               <a:rPr lang="en-US" smtClean="0"/>
-              <a:t>6/5/2017</a:t>
+              <a:t>6/6/2017</a:t>
             </a:fld>
             <a:endParaRPr lang="en-US"/>
           </a:p>
@@ -3213,7 +3213,7 @@
           <a:p>
             <a:fld id="{43BCD765-5746-4CF0-A4A3-8D605663D487}" type="datetime1">
               <a:rPr lang="en-US" smtClean="0"/>
-              <a:t>6/5/2017</a:t>
+              <a:t>6/6/2017</a:t>
             </a:fld>
             <a:endParaRPr lang="en-US"/>
           </a:p>
@@ -3426,7 +3426,7 @@
           <a:p>
             <a:fld id="{9CCE6136-CE43-4DBF-98E4-9D97BE59DE46}" type="datetime1">
               <a:rPr lang="en-US" smtClean="0"/>
-              <a:t>6/5/2017</a:t>
+              <a:t>6/6/2017</a:t>
             </a:fld>
             <a:endParaRPr lang="en-US"/>
           </a:p>
@@ -4416,7 +4416,6 @@
               <a:rPr lang="en-US" dirty="0" smtClean="0"/>
               <a:t>To insert: </a:t>
             </a:r>
-            <a:endParaRPr lang="en-US" dirty="0" smtClean="0"/>
           </a:p>
           <a:p>
             <a:r>
@@ -4429,7 +4428,6 @@
               <a:rPr lang="en-US" dirty="0" smtClean="0"/>
               <a:t>Actual Testing Assembly – High res photo</a:t>
             </a:r>
-            <a:endParaRPr lang="en-US" dirty="0" smtClean="0"/>
           </a:p>
         </p:txBody>
       </p:sp>
@@ -4463,9 +4461,12 @@
           <a:p>
             <a:r>
               <a:rPr lang="en-US" dirty="0" smtClean="0"/>
-              <a:t>High level look at the thing we created: a testing and development platform for an electric feed system </a:t>
-            </a:r>
-            <a:endParaRPr lang="en-US" dirty="0" smtClean="0"/>
+              <a:t>look </a:t>
+            </a:r>
+            <a:r>
+              <a:rPr lang="en-US" dirty="0" smtClean="0"/>
+              <a:t>at the thing we created: a testing and development platform for an electric feed system </a:t>
+            </a:r>
           </a:p>
         </p:txBody>
       </p:sp>
@@ -4666,7 +4667,6 @@
               <a:rPr lang="en-US" dirty="0" smtClean="0"/>
               <a:t>To insert: </a:t>
             </a:r>
-            <a:endParaRPr lang="en-US" dirty="0" smtClean="0"/>
           </a:p>
           <a:p>
             <a:r>
@@ -4706,11 +4706,7 @@
           <a:p>
             <a:r>
               <a:rPr lang="en-US" dirty="0" smtClean="0"/>
-              <a:t>Notes</a:t>
-            </a:r>
-            <a:r>
-              <a:rPr lang="en-US" dirty="0" smtClean="0"/>
-              <a:t>:</a:t>
+              <a:t>Notes:</a:t>
             </a:r>
           </a:p>
           <a:p>
@@ -4752,7 +4748,6 @@
               <a:rPr lang="en-US" dirty="0" smtClean="0"/>
               <a:t>Shaft </a:t>
             </a:r>
-            <a:endParaRPr lang="en-US" dirty="0" smtClean="0"/>
           </a:p>
         </p:txBody>
       </p:sp>
@@ -4953,7 +4948,6 @@
               <a:rPr lang="en-US" dirty="0" smtClean="0"/>
               <a:t>To insert: </a:t>
             </a:r>
-            <a:endParaRPr lang="en-US" dirty="0" smtClean="0"/>
           </a:p>
           <a:p>
             <a:r>
@@ -4996,11 +4990,7 @@
           <a:p>
             <a:r>
               <a:rPr lang="en-US" dirty="0" smtClean="0"/>
-              <a:t>Notes</a:t>
-            </a:r>
-            <a:r>
-              <a:rPr lang="en-US" dirty="0" smtClean="0"/>
-              <a:t>:</a:t>
+              <a:t>Notes:</a:t>
             </a:r>
           </a:p>
           <a:p>
@@ -5021,7 +5011,6 @@
               <a:rPr lang="en-US" dirty="0" smtClean="0"/>
               <a:t>Motor / esc / battery / control</a:t>
             </a:r>
-            <a:endParaRPr lang="en-US" dirty="0" smtClean="0"/>
           </a:p>
           <a:p>
             <a:pPr lvl="1"/>
@@ -5036,7 +5025,6 @@
               <a:rPr lang="en-US" dirty="0" smtClean="0"/>
               <a:t>Motor coupling – Alignment and verifying runout  (angular / offset)</a:t>
             </a:r>
-            <a:endParaRPr lang="en-US" dirty="0" smtClean="0"/>
           </a:p>
         </p:txBody>
       </p:sp>
@@ -5237,7 +5225,6 @@
               <a:rPr lang="en-US" dirty="0" smtClean="0"/>
               <a:t>To insert: </a:t>
             </a:r>
-            <a:endParaRPr lang="en-US" dirty="0" smtClean="0"/>
           </a:p>
           <a:p>
             <a:r>
@@ -5256,7 +5243,6 @@
               <a:rPr lang="en-US" dirty="0" smtClean="0"/>
               <a:t>Photo of DAQ / measurement / harness</a:t>
             </a:r>
-            <a:endParaRPr lang="en-US" dirty="0" smtClean="0"/>
           </a:p>
         </p:txBody>
       </p:sp>
@@ -5284,11 +5270,7 @@
           <a:p>
             <a:r>
               <a:rPr lang="en-US" dirty="0" smtClean="0"/>
-              <a:t>Notes</a:t>
-            </a:r>
-            <a:r>
-              <a:rPr lang="en-US" dirty="0" smtClean="0"/>
-              <a:t>:</a:t>
+              <a:t>Notes:</a:t>
             </a:r>
           </a:p>
           <a:p>
@@ -5309,7 +5291,6 @@
               <a:rPr lang="en-US" dirty="0" smtClean="0"/>
               <a:t>Tank, suction line, discharge, experimental procedure, cooling </a:t>
             </a:r>
-            <a:endParaRPr lang="en-US" dirty="0" smtClean="0"/>
           </a:p>
           <a:p>
             <a:pPr lvl="1"/>
@@ -5328,7 +5309,6 @@
               <a:rPr lang="en-US" dirty="0" smtClean="0"/>
               <a:t>Pressure, flow, RPM, Torque</a:t>
             </a:r>
-            <a:endParaRPr lang="en-US" dirty="0" smtClean="0"/>
           </a:p>
           <a:p>
             <a:pPr lvl="1"/>

</xml_diff>

<commit_message>
im so smart, more content
</commit_message>
<xml_diff>
--- a/Docs/Presentations/Slides/#5 design and subsystems.pptx
+++ b/Docs/Presentations/Slides/#5 design and subsystems.pptx
@@ -5,21 +5,22 @@
     <p:sldMasterId id="2147483660" r:id="rId1"/>
   </p:sldMasterIdLst>
   <p:notesMasterIdLst>
-    <p:notesMasterId r:id="rId11"/>
+    <p:notesMasterId r:id="rId12"/>
   </p:notesMasterIdLst>
   <p:handoutMasterIdLst>
-    <p:handoutMasterId r:id="rId12"/>
+    <p:handoutMasterId r:id="rId13"/>
   </p:handoutMasterIdLst>
   <p:sldIdLst>
     <p:sldId id="257" r:id="rId2"/>
     <p:sldId id="258" r:id="rId3"/>
     <p:sldId id="265" r:id="rId4"/>
     <p:sldId id="256" r:id="rId5"/>
-    <p:sldId id="264" r:id="rId6"/>
+    <p:sldId id="267" r:id="rId6"/>
     <p:sldId id="261" r:id="rId7"/>
-    <p:sldId id="262" r:id="rId8"/>
-    <p:sldId id="266" r:id="rId9"/>
-    <p:sldId id="263" r:id="rId10"/>
+    <p:sldId id="264" r:id="rId8"/>
+    <p:sldId id="262" r:id="rId9"/>
+    <p:sldId id="266" r:id="rId10"/>
+    <p:sldId id="263" r:id="rId11"/>
   </p:sldIdLst>
   <p:sldSz cx="12192000" cy="6858000"/>
   <p:notesSz cx="6858000" cy="9144000"/>
@@ -874,7 +875,7 @@
           <a:p>
             <a:fld id="{41270EAE-2722-4055-9DC6-0148D79BD176}" type="slidenum">
               <a:rPr lang="en-US" smtClean="0"/>
-              <a:t>5</a:t>
+              <a:t>6</a:t>
             </a:fld>
             <a:endParaRPr lang="en-US"/>
           </a:p>
@@ -883,7 +884,7 @@
     </p:spTree>
     <p:extLst>
       <p:ext uri="{BB962C8B-B14F-4D97-AF65-F5344CB8AC3E}">
-        <p14:creationId xmlns:p14="http://schemas.microsoft.com/office/powerpoint/2010/main" val="2165485284"/>
+        <p14:creationId xmlns:p14="http://schemas.microsoft.com/office/powerpoint/2010/main" val="2024971173"/>
       </p:ext>
     </p:extLst>
   </p:cSld>
@@ -958,7 +959,7 @@
           <a:p>
             <a:fld id="{41270EAE-2722-4055-9DC6-0148D79BD176}" type="slidenum">
               <a:rPr lang="en-US" smtClean="0"/>
-              <a:t>6</a:t>
+              <a:t>7</a:t>
             </a:fld>
             <a:endParaRPr lang="en-US"/>
           </a:p>
@@ -967,7 +968,7 @@
     </p:spTree>
     <p:extLst>
       <p:ext uri="{BB962C8B-B14F-4D97-AF65-F5344CB8AC3E}">
-        <p14:creationId xmlns:p14="http://schemas.microsoft.com/office/powerpoint/2010/main" val="2024971173"/>
+        <p14:creationId xmlns:p14="http://schemas.microsoft.com/office/powerpoint/2010/main" val="2165485284"/>
       </p:ext>
     </p:extLst>
   </p:cSld>
@@ -1042,7 +1043,7 @@
           <a:p>
             <a:fld id="{41270EAE-2722-4055-9DC6-0148D79BD176}" type="slidenum">
               <a:rPr lang="en-US" smtClean="0"/>
-              <a:t>7</a:t>
+              <a:t>8</a:t>
             </a:fld>
             <a:endParaRPr lang="en-US"/>
           </a:p>
@@ -1126,7 +1127,7 @@
           <a:p>
             <a:fld id="{41270EAE-2722-4055-9DC6-0148D79BD176}" type="slidenum">
               <a:rPr lang="en-US" smtClean="0"/>
-              <a:t>8</a:t>
+              <a:t>9</a:t>
             </a:fld>
             <a:endParaRPr lang="en-US"/>
           </a:p>
@@ -1210,7 +1211,7 @@
           <a:p>
             <a:fld id="{41270EAE-2722-4055-9DC6-0148D79BD176}" type="slidenum">
               <a:rPr lang="en-US" smtClean="0"/>
-              <a:t>9</a:t>
+              <a:t>10</a:t>
             </a:fld>
             <a:endParaRPr lang="en-US"/>
           </a:p>
@@ -4411,6 +4412,308 @@
 </p:sld>
 </file>
 
+<file path=ppt/slides/slide10.xml><?xml version="1.0" encoding="utf-8"?>
+<p:sld xmlns:a="http://schemas.openxmlformats.org/drawingml/2006/main" xmlns:r="http://schemas.openxmlformats.org/officeDocument/2006/relationships" xmlns:p="http://schemas.openxmlformats.org/presentationml/2006/main">
+  <p:cSld>
+    <p:spTree>
+      <p:nvGrpSpPr>
+        <p:cNvPr id="1" name=""/>
+        <p:cNvGrpSpPr/>
+        <p:nvPr/>
+      </p:nvGrpSpPr>
+      <p:grpSpPr>
+        <a:xfrm>
+          <a:off x="0" y="0"/>
+          <a:ext cx="0" cy="0"/>
+          <a:chOff x="0" y="0"/>
+          <a:chExt cx="0" cy="0"/>
+        </a:xfrm>
+      </p:grpSpPr>
+      <p:sp>
+        <p:nvSpPr>
+          <p:cNvPr id="4" name="Slide Number Placeholder 3"/>
+          <p:cNvSpPr>
+            <a:spLocks noGrp="1"/>
+          </p:cNvSpPr>
+          <p:nvPr>
+            <p:ph type="sldNum" sz="quarter" idx="12"/>
+          </p:nvPr>
+        </p:nvSpPr>
+        <p:spPr>
+          <a:xfrm>
+            <a:off x="9306059" y="6438513"/>
+            <a:ext cx="2743200" cy="365125"/>
+          </a:xfrm>
+        </p:spPr>
+        <p:txBody>
+          <a:bodyPr/>
+          <a:lstStyle/>
+          <a:p>
+            <a:fld id="{27225834-A5F4-4780-A9FC-586FB30F9BB0}" type="slidenum">
+              <a:rPr lang="en-US" smtClean="0">
+                <a:latin typeface="Garamond" panose="02020404030301010803" pitchFamily="18" charset="0"/>
+              </a:rPr>
+              <a:t>10</a:t>
+            </a:fld>
+            <a:endParaRPr lang="en-US" dirty="0">
+              <a:latin typeface="Garamond" panose="02020404030301010803" pitchFamily="18" charset="0"/>
+            </a:endParaRPr>
+          </a:p>
+        </p:txBody>
+      </p:sp>
+      <p:sp>
+        <p:nvSpPr>
+          <p:cNvPr id="19" name="TextBox 18"/>
+          <p:cNvSpPr txBox="1"/>
+          <p:nvPr/>
+        </p:nvSpPr>
+        <p:spPr>
+          <a:xfrm>
+            <a:off x="128788" y="6482577"/>
+            <a:ext cx="4201920" cy="276999"/>
+          </a:xfrm>
+          <a:prstGeom prst="rect">
+            <a:avLst/>
+          </a:prstGeom>
+          <a:noFill/>
+        </p:spPr>
+        <p:txBody>
+          <a:bodyPr wrap="none" rtlCol="0">
+            <a:spAutoFit/>
+          </a:bodyPr>
+          <a:lstStyle/>
+          <a:p>
+            <a:r>
+              <a:rPr lang="en-US" sz="1200" dirty="0" smtClean="0">
+                <a:latin typeface="Garamond" panose="02020404030301010803" pitchFamily="18" charset="0"/>
+                <a:cs typeface="Times New Roman" panose="02020603050405020304" pitchFamily="18" charset="0"/>
+              </a:rPr>
+              <a:t>Portland State Aerospace Society | Electric Propellant Feed System</a:t>
+            </a:r>
+            <a:endParaRPr lang="en-US" sz="1200" dirty="0">
+              <a:latin typeface="Garamond" panose="02020404030301010803" pitchFamily="18" charset="0"/>
+              <a:cs typeface="Times New Roman" panose="02020603050405020304" pitchFamily="18" charset="0"/>
+            </a:endParaRPr>
+          </a:p>
+        </p:txBody>
+      </p:sp>
+      <p:sp>
+        <p:nvSpPr>
+          <p:cNvPr id="5" name="TextBox 4"/>
+          <p:cNvSpPr txBox="1"/>
+          <p:nvPr/>
+        </p:nvSpPr>
+        <p:spPr>
+          <a:xfrm>
+            <a:off x="128788" y="0"/>
+            <a:ext cx="1685077" cy="276999"/>
+          </a:xfrm>
+          <a:prstGeom prst="rect">
+            <a:avLst/>
+          </a:prstGeom>
+          <a:noFill/>
+        </p:spPr>
+        <p:txBody>
+          <a:bodyPr wrap="none" rtlCol="0">
+            <a:spAutoFit/>
+          </a:bodyPr>
+          <a:lstStyle/>
+          <a:p>
+            <a:r>
+              <a:rPr lang="en-US" sz="1200" dirty="0" smtClean="0">
+                <a:latin typeface="Garamond" panose="02020404030301010803" pitchFamily="18" charset="0"/>
+                <a:cs typeface="Times New Roman" panose="02020603050405020304" pitchFamily="18" charset="0"/>
+              </a:rPr>
+              <a:t>Final Design: Subsystem </a:t>
+            </a:r>
+            <a:endParaRPr lang="en-US" sz="1200" dirty="0">
+              <a:latin typeface="Garamond" panose="02020404030301010803" pitchFamily="18" charset="0"/>
+              <a:cs typeface="Times New Roman" panose="02020603050405020304" pitchFamily="18" charset="0"/>
+            </a:endParaRPr>
+          </a:p>
+        </p:txBody>
+      </p:sp>
+      <p:sp>
+        <p:nvSpPr>
+          <p:cNvPr id="13" name="TextBox 12"/>
+          <p:cNvSpPr txBox="1"/>
+          <p:nvPr/>
+        </p:nvSpPr>
+        <p:spPr>
+          <a:xfrm>
+            <a:off x="7603250" y="138499"/>
+            <a:ext cx="6490448" cy="1200329"/>
+          </a:xfrm>
+          <a:prstGeom prst="rect">
+            <a:avLst/>
+          </a:prstGeom>
+          <a:noFill/>
+        </p:spPr>
+        <p:txBody>
+          <a:bodyPr wrap="square" rtlCol="0">
+            <a:spAutoFit/>
+          </a:bodyPr>
+          <a:lstStyle/>
+          <a:p>
+            <a:r>
+              <a:rPr lang="en-US" dirty="0" smtClean="0"/>
+              <a:t>To insert: </a:t>
+            </a:r>
+          </a:p>
+          <a:p>
+            <a:r>
+              <a:rPr lang="en-US" dirty="0" smtClean="0"/>
+              <a:t>Flow diagram of testing apparatus – Diagram</a:t>
+            </a:r>
+          </a:p>
+          <a:p>
+            <a:r>
+              <a:rPr lang="en-US" dirty="0" smtClean="0"/>
+              <a:t>Photo of the testing apparatus – high res photo</a:t>
+            </a:r>
+          </a:p>
+          <a:p>
+            <a:r>
+              <a:rPr lang="en-US" dirty="0" smtClean="0"/>
+              <a:t>Photo of DAQ / measurement / harness</a:t>
+            </a:r>
+          </a:p>
+        </p:txBody>
+      </p:sp>
+      <p:sp>
+        <p:nvSpPr>
+          <p:cNvPr id="15" name="TextBox 14"/>
+          <p:cNvSpPr txBox="1"/>
+          <p:nvPr/>
+        </p:nvSpPr>
+        <p:spPr>
+          <a:xfrm>
+            <a:off x="0" y="553998"/>
+            <a:ext cx="7339263" cy="2308324"/>
+          </a:xfrm>
+          <a:prstGeom prst="rect">
+            <a:avLst/>
+          </a:prstGeom>
+          <a:noFill/>
+        </p:spPr>
+        <p:txBody>
+          <a:bodyPr wrap="square" rtlCol="0">
+            <a:spAutoFit/>
+          </a:bodyPr>
+          <a:lstStyle/>
+          <a:p>
+            <a:r>
+              <a:rPr lang="en-US" dirty="0" smtClean="0"/>
+              <a:t>Notes:</a:t>
+            </a:r>
+          </a:p>
+          <a:p>
+            <a:r>
+              <a:rPr lang="en-US" dirty="0" smtClean="0"/>
+              <a:t>Subsystem breakdown:</a:t>
+            </a:r>
+          </a:p>
+          <a:p>
+            <a:r>
+              <a:rPr lang="en-US" dirty="0" smtClean="0"/>
+              <a:t>Testing Apparatus:</a:t>
+            </a:r>
+          </a:p>
+          <a:p>
+            <a:pPr lvl="1"/>
+            <a:r>
+              <a:rPr lang="en-US" dirty="0" smtClean="0"/>
+              <a:t>Tank, suction line, discharge, experimental procedure, cooling </a:t>
+            </a:r>
+          </a:p>
+          <a:p>
+            <a:pPr lvl="1"/>
+            <a:r>
+              <a:rPr lang="en-US" dirty="0" smtClean="0"/>
+              <a:t>Sensing </a:t>
+            </a:r>
+          </a:p>
+          <a:p>
+            <a:pPr lvl="1"/>
+            <a:r>
+              <a:rPr lang="en-US" dirty="0"/>
+              <a:t>	</a:t>
+            </a:r>
+            <a:r>
+              <a:rPr lang="en-US" dirty="0" smtClean="0"/>
+              <a:t>Pressure, flow, RPM, Torque</a:t>
+            </a:r>
+          </a:p>
+          <a:p>
+            <a:pPr lvl="1"/>
+            <a:r>
+              <a:rPr lang="en-US" dirty="0" smtClean="0"/>
+              <a:t>Data Acquisition</a:t>
+            </a:r>
+          </a:p>
+          <a:p>
+            <a:pPr lvl="1"/>
+            <a:r>
+              <a:rPr lang="en-US" dirty="0"/>
+              <a:t>	</a:t>
+            </a:r>
+            <a:r>
+              <a:rPr lang="en-US" dirty="0" smtClean="0"/>
+              <a:t>Arduino to excel </a:t>
+            </a:r>
+          </a:p>
+        </p:txBody>
+      </p:sp>
+      <p:cxnSp>
+        <p:nvCxnSpPr>
+          <p:cNvPr id="16" name="Straight Connector 15"/>
+          <p:cNvCxnSpPr/>
+          <p:nvPr/>
+        </p:nvCxnSpPr>
+        <p:spPr>
+          <a:xfrm>
+            <a:off x="235677" y="276999"/>
+            <a:ext cx="307199" cy="0"/>
+          </a:xfrm>
+          <a:prstGeom prst="line">
+            <a:avLst/>
+          </a:prstGeom>
+        </p:spPr>
+        <p:style>
+          <a:lnRef idx="1">
+            <a:schemeClr val="dk1"/>
+          </a:lnRef>
+          <a:fillRef idx="0">
+            <a:schemeClr val="dk1"/>
+          </a:fillRef>
+          <a:effectRef idx="0">
+            <a:schemeClr val="dk1"/>
+          </a:effectRef>
+          <a:fontRef idx="minor">
+            <a:schemeClr val="tx1"/>
+          </a:fontRef>
+        </p:style>
+      </p:cxnSp>
+    </p:spTree>
+    <p:extLst>
+      <p:ext uri="{BB962C8B-B14F-4D97-AF65-F5344CB8AC3E}">
+        <p14:creationId xmlns:p14="http://schemas.microsoft.com/office/powerpoint/2010/main" val="1989979975"/>
+      </p:ext>
+    </p:extLst>
+  </p:cSld>
+  <p:clrMapOvr>
+    <a:masterClrMapping/>
+  </p:clrMapOvr>
+  <p:timing>
+    <p:tnLst>
+      <p:par>
+        <p:cTn id="1" dur="indefinite" restart="never" nodeType="tmRoot"/>
+      </p:par>
+    </p:tnLst>
+  </p:timing>
+</p:sld>
+</file>
+
 <file path=ppt/slides/slide2.xml><?xml version="1.0" encoding="utf-8"?>
 <p:sld xmlns:a="http://schemas.openxmlformats.org/drawingml/2006/main" xmlns:r="http://schemas.openxmlformats.org/officeDocument/2006/relationships" xmlns:p="http://schemas.openxmlformats.org/presentationml/2006/main">
   <p:cSld>
@@ -5179,6 +5482,833 @@
             <p:ph type="sldNum" sz="quarter" idx="12"/>
           </p:nvPr>
         </p:nvSpPr>
+        <p:spPr/>
+        <p:txBody>
+          <a:bodyPr/>
+          <a:lstStyle/>
+          <a:p>
+            <a:fld id="{27225834-A5F4-4780-A9FC-586FB30F9BB0}" type="slidenum">
+              <a:rPr lang="en-US" smtClean="0"/>
+              <a:t>5</a:t>
+            </a:fld>
+            <a:endParaRPr lang="en-US"/>
+          </a:p>
+        </p:txBody>
+      </p:sp>
+      <p:sp>
+        <p:nvSpPr>
+          <p:cNvPr id="5" name="TextBox 4"/>
+          <p:cNvSpPr txBox="1"/>
+          <p:nvPr/>
+        </p:nvSpPr>
+        <p:spPr>
+          <a:xfrm>
+            <a:off x="4663440" y="786384"/>
+            <a:ext cx="2359152" cy="369332"/>
+          </a:xfrm>
+          <a:prstGeom prst="rect">
+            <a:avLst/>
+          </a:prstGeom>
+          <a:noFill/>
+          <a:ln>
+            <a:solidFill>
+              <a:schemeClr val="tx1"/>
+            </a:solidFill>
+          </a:ln>
+        </p:spPr>
+        <p:txBody>
+          <a:bodyPr wrap="square" rtlCol="0">
+            <a:spAutoFit/>
+          </a:bodyPr>
+          <a:lstStyle/>
+          <a:p>
+            <a:pPr algn="ctr"/>
+            <a:r>
+              <a:rPr lang="en-US" dirty="0" smtClean="0"/>
+              <a:t>Electric Feed System </a:t>
+            </a:r>
+          </a:p>
+        </p:txBody>
+      </p:sp>
+      <p:sp>
+        <p:nvSpPr>
+          <p:cNvPr id="6" name="TextBox 5"/>
+          <p:cNvSpPr txBox="1"/>
+          <p:nvPr/>
+        </p:nvSpPr>
+        <p:spPr>
+          <a:xfrm>
+            <a:off x="441960" y="1694688"/>
+            <a:ext cx="4806696" cy="369332"/>
+          </a:xfrm>
+          <a:prstGeom prst="rect">
+            <a:avLst/>
+          </a:prstGeom>
+          <a:noFill/>
+          <a:ln>
+            <a:solidFill>
+              <a:schemeClr val="tx1"/>
+            </a:solidFill>
+          </a:ln>
+        </p:spPr>
+        <p:txBody>
+          <a:bodyPr wrap="square" rtlCol="0">
+            <a:spAutoFit/>
+          </a:bodyPr>
+          <a:lstStyle/>
+          <a:p>
+            <a:pPr algn="ctr"/>
+            <a:r>
+              <a:rPr lang="en-US" dirty="0" smtClean="0"/>
+              <a:t>Pump </a:t>
+            </a:r>
+          </a:p>
+        </p:txBody>
+      </p:sp>
+      <p:sp>
+        <p:nvSpPr>
+          <p:cNvPr id="7" name="TextBox 6"/>
+          <p:cNvSpPr txBox="1"/>
+          <p:nvPr/>
+        </p:nvSpPr>
+        <p:spPr>
+          <a:xfrm>
+            <a:off x="441960" y="2215896"/>
+            <a:ext cx="2359152" cy="369332"/>
+          </a:xfrm>
+          <a:prstGeom prst="rect">
+            <a:avLst/>
+          </a:prstGeom>
+          <a:noFill/>
+          <a:ln>
+            <a:solidFill>
+              <a:schemeClr val="tx1"/>
+            </a:solidFill>
+          </a:ln>
+        </p:spPr>
+        <p:txBody>
+          <a:bodyPr wrap="square" rtlCol="0">
+            <a:spAutoFit/>
+          </a:bodyPr>
+          <a:lstStyle/>
+          <a:p>
+            <a:pPr algn="ctr"/>
+            <a:r>
+              <a:rPr lang="en-US" dirty="0" smtClean="0"/>
+              <a:t>Casing  </a:t>
+            </a:r>
+          </a:p>
+        </p:txBody>
+      </p:sp>
+      <p:sp>
+        <p:nvSpPr>
+          <p:cNvPr id="8" name="TextBox 7"/>
+          <p:cNvSpPr txBox="1"/>
+          <p:nvPr/>
+        </p:nvSpPr>
+        <p:spPr>
+          <a:xfrm>
+            <a:off x="2889504" y="2215896"/>
+            <a:ext cx="2359152" cy="369332"/>
+          </a:xfrm>
+          <a:prstGeom prst="rect">
+            <a:avLst/>
+          </a:prstGeom>
+          <a:noFill/>
+          <a:ln>
+            <a:solidFill>
+              <a:schemeClr val="tx1"/>
+            </a:solidFill>
+          </a:ln>
+        </p:spPr>
+        <p:txBody>
+          <a:bodyPr wrap="square" rtlCol="0">
+            <a:spAutoFit/>
+          </a:bodyPr>
+          <a:lstStyle/>
+          <a:p>
+            <a:pPr algn="ctr"/>
+            <a:r>
+              <a:rPr lang="en-US" dirty="0" smtClean="0"/>
+              <a:t>Motor  </a:t>
+            </a:r>
+          </a:p>
+        </p:txBody>
+      </p:sp>
+      <p:sp>
+        <p:nvSpPr>
+          <p:cNvPr id="9" name="TextBox 8"/>
+          <p:cNvSpPr txBox="1"/>
+          <p:nvPr/>
+        </p:nvSpPr>
+        <p:spPr>
+          <a:xfrm>
+            <a:off x="3307080" y="2670048"/>
+            <a:ext cx="1941576" cy="369332"/>
+          </a:xfrm>
+          <a:prstGeom prst="rect">
+            <a:avLst/>
+          </a:prstGeom>
+          <a:noFill/>
+          <a:ln>
+            <a:solidFill>
+              <a:schemeClr val="tx1"/>
+            </a:solidFill>
+          </a:ln>
+        </p:spPr>
+        <p:txBody>
+          <a:bodyPr wrap="square" rtlCol="0">
+            <a:spAutoFit/>
+          </a:bodyPr>
+          <a:lstStyle/>
+          <a:p>
+            <a:pPr algn="ctr"/>
+            <a:r>
+              <a:rPr lang="en-US" dirty="0" smtClean="0"/>
+              <a:t>Dyno Mount</a:t>
+            </a:r>
+          </a:p>
+        </p:txBody>
+      </p:sp>
+      <p:sp>
+        <p:nvSpPr>
+          <p:cNvPr id="10" name="TextBox 9"/>
+          <p:cNvSpPr txBox="1"/>
+          <p:nvPr/>
+        </p:nvSpPr>
+        <p:spPr>
+          <a:xfrm>
+            <a:off x="3307080" y="3124200"/>
+            <a:ext cx="1941576" cy="369332"/>
+          </a:xfrm>
+          <a:prstGeom prst="rect">
+            <a:avLst/>
+          </a:prstGeom>
+          <a:noFill/>
+          <a:ln>
+            <a:solidFill>
+              <a:schemeClr val="tx1"/>
+            </a:solidFill>
+          </a:ln>
+        </p:spPr>
+        <p:txBody>
+          <a:bodyPr wrap="square" rtlCol="0">
+            <a:spAutoFit/>
+          </a:bodyPr>
+          <a:lstStyle/>
+          <a:p>
+            <a:pPr algn="ctr"/>
+            <a:r>
+              <a:rPr lang="en-US" dirty="0" smtClean="0"/>
+              <a:t>ESC  </a:t>
+            </a:r>
+          </a:p>
+        </p:txBody>
+      </p:sp>
+      <p:sp>
+        <p:nvSpPr>
+          <p:cNvPr id="11" name="TextBox 10"/>
+          <p:cNvSpPr txBox="1"/>
+          <p:nvPr/>
+        </p:nvSpPr>
+        <p:spPr>
+          <a:xfrm>
+            <a:off x="3307080" y="3645408"/>
+            <a:ext cx="1941576" cy="369332"/>
+          </a:xfrm>
+          <a:prstGeom prst="rect">
+            <a:avLst/>
+          </a:prstGeom>
+          <a:noFill/>
+          <a:ln>
+            <a:solidFill>
+              <a:schemeClr val="tx1"/>
+            </a:solidFill>
+          </a:ln>
+        </p:spPr>
+        <p:txBody>
+          <a:bodyPr wrap="square" rtlCol="0">
+            <a:spAutoFit/>
+          </a:bodyPr>
+          <a:lstStyle/>
+          <a:p>
+            <a:pPr algn="ctr"/>
+            <a:r>
+              <a:rPr lang="en-US" dirty="0" smtClean="0"/>
+              <a:t>Batteries  </a:t>
+            </a:r>
+          </a:p>
+        </p:txBody>
+      </p:sp>
+      <p:sp>
+        <p:nvSpPr>
+          <p:cNvPr id="12" name="TextBox 11"/>
+          <p:cNvSpPr txBox="1"/>
+          <p:nvPr/>
+        </p:nvSpPr>
+        <p:spPr>
+          <a:xfrm>
+            <a:off x="3307080" y="4145280"/>
+            <a:ext cx="1941576" cy="369332"/>
+          </a:xfrm>
+          <a:prstGeom prst="rect">
+            <a:avLst/>
+          </a:prstGeom>
+          <a:noFill/>
+          <a:ln>
+            <a:solidFill>
+              <a:schemeClr val="tx1"/>
+            </a:solidFill>
+          </a:ln>
+        </p:spPr>
+        <p:txBody>
+          <a:bodyPr wrap="square" rtlCol="0">
+            <a:spAutoFit/>
+          </a:bodyPr>
+          <a:lstStyle/>
+          <a:p>
+            <a:pPr algn="ctr"/>
+            <a:r>
+              <a:rPr lang="en-US" dirty="0" smtClean="0"/>
+              <a:t>Controls  </a:t>
+            </a:r>
+          </a:p>
+        </p:txBody>
+      </p:sp>
+      <p:sp>
+        <p:nvSpPr>
+          <p:cNvPr id="13" name="TextBox 12"/>
+          <p:cNvSpPr txBox="1"/>
+          <p:nvPr/>
+        </p:nvSpPr>
+        <p:spPr>
+          <a:xfrm>
+            <a:off x="688848" y="2667000"/>
+            <a:ext cx="2112264" cy="369332"/>
+          </a:xfrm>
+          <a:prstGeom prst="rect">
+            <a:avLst/>
+          </a:prstGeom>
+          <a:noFill/>
+          <a:ln>
+            <a:solidFill>
+              <a:schemeClr val="tx1"/>
+            </a:solidFill>
+          </a:ln>
+        </p:spPr>
+        <p:txBody>
+          <a:bodyPr wrap="square" rtlCol="0">
+            <a:spAutoFit/>
+          </a:bodyPr>
+          <a:lstStyle/>
+          <a:p>
+            <a:pPr algn="ctr"/>
+            <a:r>
+              <a:rPr lang="en-US" dirty="0" smtClean="0"/>
+              <a:t>Hydraulic</a:t>
+            </a:r>
+          </a:p>
+        </p:txBody>
+      </p:sp>
+      <p:sp>
+        <p:nvSpPr>
+          <p:cNvPr id="14" name="TextBox 13"/>
+          <p:cNvSpPr txBox="1"/>
+          <p:nvPr/>
+        </p:nvSpPr>
+        <p:spPr>
+          <a:xfrm>
+            <a:off x="688848" y="3124200"/>
+            <a:ext cx="2112264" cy="369332"/>
+          </a:xfrm>
+          <a:prstGeom prst="rect">
+            <a:avLst/>
+          </a:prstGeom>
+          <a:noFill/>
+          <a:ln>
+            <a:solidFill>
+              <a:schemeClr val="tx1"/>
+            </a:solidFill>
+          </a:ln>
+        </p:spPr>
+        <p:txBody>
+          <a:bodyPr wrap="square" rtlCol="0">
+            <a:spAutoFit/>
+          </a:bodyPr>
+          <a:lstStyle/>
+          <a:p>
+            <a:pPr algn="ctr"/>
+            <a:r>
+              <a:rPr lang="en-US" dirty="0" smtClean="0"/>
+              <a:t>Mechanical </a:t>
+            </a:r>
+          </a:p>
+        </p:txBody>
+      </p:sp>
+      <p:sp>
+        <p:nvSpPr>
+          <p:cNvPr id="15" name="TextBox 14"/>
+          <p:cNvSpPr txBox="1"/>
+          <p:nvPr/>
+        </p:nvSpPr>
+        <p:spPr>
+          <a:xfrm>
+            <a:off x="868680" y="3550920"/>
+            <a:ext cx="1932432" cy="369332"/>
+          </a:xfrm>
+          <a:prstGeom prst="rect">
+            <a:avLst/>
+          </a:prstGeom>
+          <a:noFill/>
+          <a:ln>
+            <a:solidFill>
+              <a:schemeClr val="tx1"/>
+            </a:solidFill>
+          </a:ln>
+        </p:spPr>
+        <p:txBody>
+          <a:bodyPr wrap="square" rtlCol="0">
+            <a:spAutoFit/>
+          </a:bodyPr>
+          <a:lstStyle/>
+          <a:p>
+            <a:pPr algn="ctr"/>
+            <a:r>
+              <a:rPr lang="en-US" dirty="0" smtClean="0"/>
+              <a:t>Bearings</a:t>
+            </a:r>
+          </a:p>
+        </p:txBody>
+      </p:sp>
+      <p:sp>
+        <p:nvSpPr>
+          <p:cNvPr id="16" name="TextBox 15"/>
+          <p:cNvSpPr txBox="1"/>
+          <p:nvPr/>
+        </p:nvSpPr>
+        <p:spPr>
+          <a:xfrm>
+            <a:off x="868680" y="4014740"/>
+            <a:ext cx="1932432" cy="369332"/>
+          </a:xfrm>
+          <a:prstGeom prst="rect">
+            <a:avLst/>
+          </a:prstGeom>
+          <a:noFill/>
+          <a:ln>
+            <a:solidFill>
+              <a:schemeClr val="tx1"/>
+            </a:solidFill>
+          </a:ln>
+        </p:spPr>
+        <p:txBody>
+          <a:bodyPr wrap="square" rtlCol="0">
+            <a:spAutoFit/>
+          </a:bodyPr>
+          <a:lstStyle/>
+          <a:p>
+            <a:pPr algn="ctr"/>
+            <a:r>
+              <a:rPr lang="en-US" dirty="0"/>
+              <a:t>S</a:t>
+            </a:r>
+            <a:r>
+              <a:rPr lang="en-US" dirty="0" smtClean="0"/>
+              <a:t>eals</a:t>
+            </a:r>
+          </a:p>
+        </p:txBody>
+      </p:sp>
+      <p:sp>
+        <p:nvSpPr>
+          <p:cNvPr id="17" name="TextBox 16"/>
+          <p:cNvSpPr txBox="1"/>
+          <p:nvPr/>
+        </p:nvSpPr>
+        <p:spPr>
+          <a:xfrm>
+            <a:off x="5413248" y="1694688"/>
+            <a:ext cx="3438144" cy="369332"/>
+          </a:xfrm>
+          <a:prstGeom prst="rect">
+            <a:avLst/>
+          </a:prstGeom>
+          <a:noFill/>
+          <a:ln>
+            <a:solidFill>
+              <a:schemeClr val="tx1"/>
+            </a:solidFill>
+          </a:ln>
+        </p:spPr>
+        <p:txBody>
+          <a:bodyPr wrap="square" rtlCol="0">
+            <a:spAutoFit/>
+          </a:bodyPr>
+          <a:lstStyle/>
+          <a:p>
+            <a:pPr algn="ctr"/>
+            <a:r>
+              <a:rPr lang="en-US" dirty="0" smtClean="0"/>
+              <a:t>Testing </a:t>
+            </a:r>
+          </a:p>
+        </p:txBody>
+      </p:sp>
+      <p:sp>
+        <p:nvSpPr>
+          <p:cNvPr id="18" name="TextBox 17"/>
+          <p:cNvSpPr txBox="1"/>
+          <p:nvPr/>
+        </p:nvSpPr>
+        <p:spPr>
+          <a:xfrm>
+            <a:off x="5413248" y="2215896"/>
+            <a:ext cx="2359152" cy="369332"/>
+          </a:xfrm>
+          <a:prstGeom prst="rect">
+            <a:avLst/>
+          </a:prstGeom>
+          <a:noFill/>
+          <a:ln>
+            <a:solidFill>
+              <a:schemeClr val="tx1"/>
+            </a:solidFill>
+          </a:ln>
+        </p:spPr>
+        <p:txBody>
+          <a:bodyPr wrap="square" rtlCol="0">
+            <a:spAutoFit/>
+          </a:bodyPr>
+          <a:lstStyle/>
+          <a:p>
+            <a:pPr algn="ctr"/>
+            <a:r>
+              <a:rPr lang="en-US" dirty="0" smtClean="0"/>
+              <a:t>Apparatus</a:t>
+            </a:r>
+          </a:p>
+        </p:txBody>
+      </p:sp>
+      <p:sp>
+        <p:nvSpPr>
+          <p:cNvPr id="19" name="TextBox 18"/>
+          <p:cNvSpPr txBox="1"/>
+          <p:nvPr/>
+        </p:nvSpPr>
+        <p:spPr>
+          <a:xfrm>
+            <a:off x="7936992" y="2215896"/>
+            <a:ext cx="2359152" cy="369332"/>
+          </a:xfrm>
+          <a:prstGeom prst="rect">
+            <a:avLst/>
+          </a:prstGeom>
+          <a:noFill/>
+          <a:ln>
+            <a:solidFill>
+              <a:schemeClr val="tx1"/>
+            </a:solidFill>
+          </a:ln>
+        </p:spPr>
+        <p:txBody>
+          <a:bodyPr wrap="square" rtlCol="0">
+            <a:spAutoFit/>
+          </a:bodyPr>
+          <a:lstStyle/>
+          <a:p>
+            <a:pPr algn="ctr"/>
+            <a:r>
+              <a:rPr lang="en-US" dirty="0" smtClean="0"/>
+              <a:t>Measurement</a:t>
+            </a:r>
+          </a:p>
+        </p:txBody>
+      </p:sp>
+      <p:sp>
+        <p:nvSpPr>
+          <p:cNvPr id="20" name="TextBox 19"/>
+          <p:cNvSpPr txBox="1"/>
+          <p:nvPr/>
+        </p:nvSpPr>
+        <p:spPr>
+          <a:xfrm>
+            <a:off x="5577840" y="2667000"/>
+            <a:ext cx="2194560" cy="369332"/>
+          </a:xfrm>
+          <a:prstGeom prst="rect">
+            <a:avLst/>
+          </a:prstGeom>
+          <a:noFill/>
+          <a:ln>
+            <a:solidFill>
+              <a:schemeClr val="tx1"/>
+            </a:solidFill>
+          </a:ln>
+        </p:spPr>
+        <p:txBody>
+          <a:bodyPr wrap="square" rtlCol="0">
+            <a:spAutoFit/>
+          </a:bodyPr>
+          <a:lstStyle/>
+          <a:p>
+            <a:pPr algn="ctr"/>
+            <a:r>
+              <a:rPr lang="en-US" dirty="0" smtClean="0"/>
+              <a:t>Suction</a:t>
+            </a:r>
+          </a:p>
+        </p:txBody>
+      </p:sp>
+      <p:sp>
+        <p:nvSpPr>
+          <p:cNvPr id="21" name="TextBox 20"/>
+          <p:cNvSpPr txBox="1"/>
+          <p:nvPr/>
+        </p:nvSpPr>
+        <p:spPr>
+          <a:xfrm>
+            <a:off x="5577840" y="3118104"/>
+            <a:ext cx="2194560" cy="369332"/>
+          </a:xfrm>
+          <a:prstGeom prst="rect">
+            <a:avLst/>
+          </a:prstGeom>
+          <a:noFill/>
+          <a:ln>
+            <a:solidFill>
+              <a:schemeClr val="tx1"/>
+            </a:solidFill>
+          </a:ln>
+        </p:spPr>
+        <p:txBody>
+          <a:bodyPr wrap="square" rtlCol="0">
+            <a:spAutoFit/>
+          </a:bodyPr>
+          <a:lstStyle/>
+          <a:p>
+            <a:pPr algn="ctr"/>
+            <a:r>
+              <a:rPr lang="en-US" dirty="0" smtClean="0"/>
+              <a:t>Air pressure</a:t>
+            </a:r>
+          </a:p>
+        </p:txBody>
+      </p:sp>
+      <p:sp>
+        <p:nvSpPr>
+          <p:cNvPr id="22" name="TextBox 21"/>
+          <p:cNvSpPr txBox="1"/>
+          <p:nvPr/>
+        </p:nvSpPr>
+        <p:spPr>
+          <a:xfrm>
+            <a:off x="5577840" y="3569208"/>
+            <a:ext cx="2194560" cy="369332"/>
+          </a:xfrm>
+          <a:prstGeom prst="rect">
+            <a:avLst/>
+          </a:prstGeom>
+          <a:noFill/>
+          <a:ln>
+            <a:solidFill>
+              <a:schemeClr val="tx1"/>
+            </a:solidFill>
+          </a:ln>
+        </p:spPr>
+        <p:txBody>
+          <a:bodyPr wrap="square" rtlCol="0">
+            <a:spAutoFit/>
+          </a:bodyPr>
+          <a:lstStyle/>
+          <a:p>
+            <a:pPr algn="ctr"/>
+            <a:r>
+              <a:rPr lang="en-US" dirty="0" smtClean="0"/>
+              <a:t>Water</a:t>
+            </a:r>
+          </a:p>
+        </p:txBody>
+      </p:sp>
+      <p:sp>
+        <p:nvSpPr>
+          <p:cNvPr id="23" name="TextBox 22"/>
+          <p:cNvSpPr txBox="1"/>
+          <p:nvPr/>
+        </p:nvSpPr>
+        <p:spPr>
+          <a:xfrm>
+            <a:off x="8101584" y="2649236"/>
+            <a:ext cx="2194560" cy="369332"/>
+          </a:xfrm>
+          <a:prstGeom prst="rect">
+            <a:avLst/>
+          </a:prstGeom>
+          <a:noFill/>
+          <a:ln>
+            <a:solidFill>
+              <a:schemeClr val="tx1"/>
+            </a:solidFill>
+          </a:ln>
+        </p:spPr>
+        <p:txBody>
+          <a:bodyPr wrap="square" rtlCol="0">
+            <a:spAutoFit/>
+          </a:bodyPr>
+          <a:lstStyle/>
+          <a:p>
+            <a:pPr algn="ctr"/>
+            <a:r>
+              <a:rPr lang="en-US" dirty="0" smtClean="0"/>
+              <a:t>Pressure</a:t>
+            </a:r>
+          </a:p>
+        </p:txBody>
+      </p:sp>
+      <p:sp>
+        <p:nvSpPr>
+          <p:cNvPr id="24" name="TextBox 23"/>
+          <p:cNvSpPr txBox="1"/>
+          <p:nvPr/>
+        </p:nvSpPr>
+        <p:spPr>
+          <a:xfrm>
+            <a:off x="8101584" y="3082576"/>
+            <a:ext cx="2194560" cy="369332"/>
+          </a:xfrm>
+          <a:prstGeom prst="rect">
+            <a:avLst/>
+          </a:prstGeom>
+          <a:noFill/>
+          <a:ln>
+            <a:solidFill>
+              <a:schemeClr val="tx1"/>
+            </a:solidFill>
+          </a:ln>
+        </p:spPr>
+        <p:txBody>
+          <a:bodyPr wrap="square" rtlCol="0">
+            <a:spAutoFit/>
+          </a:bodyPr>
+          <a:lstStyle/>
+          <a:p>
+            <a:pPr algn="ctr"/>
+            <a:r>
+              <a:rPr lang="en-US" dirty="0" smtClean="0"/>
+              <a:t>RPM</a:t>
+            </a:r>
+          </a:p>
+        </p:txBody>
+      </p:sp>
+      <p:sp>
+        <p:nvSpPr>
+          <p:cNvPr id="25" name="TextBox 24"/>
+          <p:cNvSpPr txBox="1"/>
+          <p:nvPr/>
+        </p:nvSpPr>
+        <p:spPr>
+          <a:xfrm>
+            <a:off x="8101584" y="3515916"/>
+            <a:ext cx="2194560" cy="369332"/>
+          </a:xfrm>
+          <a:prstGeom prst="rect">
+            <a:avLst/>
+          </a:prstGeom>
+          <a:noFill/>
+          <a:ln>
+            <a:solidFill>
+              <a:schemeClr val="tx1"/>
+            </a:solidFill>
+          </a:ln>
+        </p:spPr>
+        <p:txBody>
+          <a:bodyPr wrap="square" rtlCol="0">
+            <a:spAutoFit/>
+          </a:bodyPr>
+          <a:lstStyle/>
+          <a:p>
+            <a:pPr algn="ctr"/>
+            <a:r>
+              <a:rPr lang="en-US" dirty="0" smtClean="0"/>
+              <a:t>Torque</a:t>
+            </a:r>
+          </a:p>
+        </p:txBody>
+      </p:sp>
+      <p:sp>
+        <p:nvSpPr>
+          <p:cNvPr id="26" name="TextBox 25"/>
+          <p:cNvSpPr txBox="1"/>
+          <p:nvPr/>
+        </p:nvSpPr>
+        <p:spPr>
+          <a:xfrm>
+            <a:off x="4277868" y="5410200"/>
+            <a:ext cx="2359152" cy="369332"/>
+          </a:xfrm>
+          <a:prstGeom prst="rect">
+            <a:avLst/>
+          </a:prstGeom>
+          <a:noFill/>
+          <a:ln>
+            <a:solidFill>
+              <a:schemeClr val="tx1"/>
+            </a:solidFill>
+          </a:ln>
+        </p:spPr>
+        <p:txBody>
+          <a:bodyPr wrap="square" rtlCol="0">
+            <a:spAutoFit/>
+          </a:bodyPr>
+          <a:lstStyle/>
+          <a:p>
+            <a:pPr algn="ctr"/>
+            <a:r>
+              <a:rPr lang="en-US" dirty="0" smtClean="0"/>
+              <a:t>Subsystem Outline</a:t>
+            </a:r>
+          </a:p>
+        </p:txBody>
+      </p:sp>
+    </p:spTree>
+    <p:extLst>
+      <p:ext uri="{BB962C8B-B14F-4D97-AF65-F5344CB8AC3E}">
+        <p14:creationId xmlns:p14="http://schemas.microsoft.com/office/powerpoint/2010/main" val="3757267738"/>
+      </p:ext>
+    </p:extLst>
+  </p:cSld>
+  <p:clrMapOvr>
+    <a:masterClrMapping/>
+  </p:clrMapOvr>
+</p:sld>
+</file>
+
+<file path=ppt/slides/slide6.xml><?xml version="1.0" encoding="utf-8"?>
+<p:sld xmlns:a="http://schemas.openxmlformats.org/drawingml/2006/main" xmlns:r="http://schemas.openxmlformats.org/officeDocument/2006/relationships" xmlns:p="http://schemas.openxmlformats.org/presentationml/2006/main">
+  <p:cSld>
+    <p:spTree>
+      <p:nvGrpSpPr>
+        <p:cNvPr id="1" name=""/>
+        <p:cNvGrpSpPr/>
+        <p:nvPr/>
+      </p:nvGrpSpPr>
+      <p:grpSpPr>
+        <a:xfrm>
+          <a:off x="0" y="0"/>
+          <a:ext cx="0" cy="0"/>
+          <a:chOff x="0" y="0"/>
+          <a:chExt cx="0" cy="0"/>
+        </a:xfrm>
+      </p:grpSpPr>
+      <p:sp>
+        <p:nvSpPr>
+          <p:cNvPr id="4" name="Slide Number Placeholder 3"/>
+          <p:cNvSpPr>
+            <a:spLocks noGrp="1"/>
+          </p:cNvSpPr>
+          <p:nvPr>
+            <p:ph type="sldNum" sz="quarter" idx="12"/>
+          </p:nvPr>
+        </p:nvSpPr>
         <p:spPr>
           <a:xfrm>
             <a:off x="9306059" y="6438513"/>
@@ -5193,7 +6323,317 @@
               <a:rPr lang="en-US" smtClean="0">
                 <a:latin typeface="Garamond" panose="02020404030301010803" pitchFamily="18" charset="0"/>
               </a:rPr>
-              <a:t>5</a:t>
+              <a:t>6</a:t>
+            </a:fld>
+            <a:endParaRPr lang="en-US" dirty="0">
+              <a:latin typeface="Garamond" panose="02020404030301010803" pitchFamily="18" charset="0"/>
+            </a:endParaRPr>
+          </a:p>
+        </p:txBody>
+      </p:sp>
+      <p:sp>
+        <p:nvSpPr>
+          <p:cNvPr id="19" name="TextBox 18"/>
+          <p:cNvSpPr txBox="1"/>
+          <p:nvPr/>
+        </p:nvSpPr>
+        <p:spPr>
+          <a:xfrm>
+            <a:off x="128788" y="6482577"/>
+            <a:ext cx="4201920" cy="276999"/>
+          </a:xfrm>
+          <a:prstGeom prst="rect">
+            <a:avLst/>
+          </a:prstGeom>
+          <a:noFill/>
+        </p:spPr>
+        <p:txBody>
+          <a:bodyPr wrap="none" rtlCol="0">
+            <a:spAutoFit/>
+          </a:bodyPr>
+          <a:lstStyle/>
+          <a:p>
+            <a:r>
+              <a:rPr lang="en-US" sz="1200" dirty="0" smtClean="0">
+                <a:latin typeface="Garamond" panose="02020404030301010803" pitchFamily="18" charset="0"/>
+                <a:cs typeface="Times New Roman" panose="02020603050405020304" pitchFamily="18" charset="0"/>
+              </a:rPr>
+              <a:t>Portland State Aerospace Society | Electric Propellant Feed System</a:t>
+            </a:r>
+            <a:endParaRPr lang="en-US" sz="1200" dirty="0">
+              <a:latin typeface="Garamond" panose="02020404030301010803" pitchFamily="18" charset="0"/>
+              <a:cs typeface="Times New Roman" panose="02020603050405020304" pitchFamily="18" charset="0"/>
+            </a:endParaRPr>
+          </a:p>
+        </p:txBody>
+      </p:sp>
+      <p:sp>
+        <p:nvSpPr>
+          <p:cNvPr id="5" name="TextBox 4"/>
+          <p:cNvSpPr txBox="1"/>
+          <p:nvPr/>
+        </p:nvSpPr>
+        <p:spPr>
+          <a:xfrm>
+            <a:off x="128788" y="0"/>
+            <a:ext cx="1685077" cy="276999"/>
+          </a:xfrm>
+          <a:prstGeom prst="rect">
+            <a:avLst/>
+          </a:prstGeom>
+          <a:noFill/>
+        </p:spPr>
+        <p:txBody>
+          <a:bodyPr wrap="none" rtlCol="0">
+            <a:spAutoFit/>
+          </a:bodyPr>
+          <a:lstStyle/>
+          <a:p>
+            <a:r>
+              <a:rPr lang="en-US" sz="1200" dirty="0" smtClean="0">
+                <a:latin typeface="Garamond" panose="02020404030301010803" pitchFamily="18" charset="0"/>
+                <a:cs typeface="Times New Roman" panose="02020603050405020304" pitchFamily="18" charset="0"/>
+              </a:rPr>
+              <a:t>Final Design: Subsystem </a:t>
+            </a:r>
+            <a:endParaRPr lang="en-US" sz="1200" dirty="0">
+              <a:latin typeface="Garamond" panose="02020404030301010803" pitchFamily="18" charset="0"/>
+              <a:cs typeface="Times New Roman" panose="02020603050405020304" pitchFamily="18" charset="0"/>
+            </a:endParaRPr>
+          </a:p>
+        </p:txBody>
+      </p:sp>
+      <p:sp>
+        <p:nvSpPr>
+          <p:cNvPr id="13" name="TextBox 12"/>
+          <p:cNvSpPr txBox="1"/>
+          <p:nvPr/>
+        </p:nvSpPr>
+        <p:spPr>
+          <a:xfrm>
+            <a:off x="7111720" y="-1359296"/>
+            <a:ext cx="6490448" cy="923330"/>
+          </a:xfrm>
+          <a:prstGeom prst="rect">
+            <a:avLst/>
+          </a:prstGeom>
+          <a:noFill/>
+        </p:spPr>
+        <p:txBody>
+          <a:bodyPr wrap="square" rtlCol="0">
+            <a:spAutoFit/>
+          </a:bodyPr>
+          <a:lstStyle/>
+          <a:p>
+            <a:r>
+              <a:rPr lang="en-US" dirty="0" smtClean="0"/>
+              <a:t>To insert: </a:t>
+            </a:r>
+          </a:p>
+          <a:p>
+            <a:r>
+              <a:rPr lang="en-US" dirty="0" smtClean="0"/>
+              <a:t>Quarter section – CAD </a:t>
+            </a:r>
+          </a:p>
+          <a:p>
+            <a:r>
+              <a:rPr lang="en-US" dirty="0" smtClean="0"/>
+              <a:t>Photo of the pump w/ casing – High Res</a:t>
+            </a:r>
+          </a:p>
+        </p:txBody>
+      </p:sp>
+      <p:sp>
+        <p:nvSpPr>
+          <p:cNvPr id="15" name="TextBox 14"/>
+          <p:cNvSpPr txBox="1"/>
+          <p:nvPr/>
+        </p:nvSpPr>
+        <p:spPr>
+          <a:xfrm>
+            <a:off x="-545432" y="-2169825"/>
+            <a:ext cx="7339263" cy="2031325"/>
+          </a:xfrm>
+          <a:prstGeom prst="rect">
+            <a:avLst/>
+          </a:prstGeom>
+          <a:noFill/>
+        </p:spPr>
+        <p:txBody>
+          <a:bodyPr wrap="square" rtlCol="0">
+            <a:spAutoFit/>
+          </a:bodyPr>
+          <a:lstStyle/>
+          <a:p>
+            <a:r>
+              <a:rPr lang="en-US" dirty="0" smtClean="0"/>
+              <a:t>Notes:</a:t>
+            </a:r>
+          </a:p>
+          <a:p>
+            <a:r>
+              <a:rPr lang="en-US" dirty="0" smtClean="0"/>
+              <a:t>Subsystem breakdown:</a:t>
+            </a:r>
+          </a:p>
+          <a:p>
+            <a:r>
+              <a:rPr lang="en-US" dirty="0" smtClean="0"/>
+              <a:t>Pump:</a:t>
+            </a:r>
+          </a:p>
+          <a:p>
+            <a:pPr lvl="1"/>
+            <a:r>
+              <a:rPr lang="en-US" dirty="0" smtClean="0"/>
+              <a:t>Bearing system</a:t>
+            </a:r>
+          </a:p>
+          <a:p>
+            <a:pPr lvl="1"/>
+            <a:r>
+              <a:rPr lang="en-US" dirty="0" smtClean="0"/>
+              <a:t>Seal system </a:t>
+            </a:r>
+          </a:p>
+          <a:p>
+            <a:pPr lvl="1"/>
+            <a:r>
+              <a:rPr lang="en-US" dirty="0" smtClean="0"/>
+              <a:t>Hydraulic system ( volute, impeller, diffuser) – highlight modular design</a:t>
+            </a:r>
+          </a:p>
+          <a:p>
+            <a:pPr lvl="1"/>
+            <a:r>
+              <a:rPr lang="en-US" dirty="0" smtClean="0"/>
+              <a:t>Shaft </a:t>
+            </a:r>
+          </a:p>
+        </p:txBody>
+      </p:sp>
+      <p:cxnSp>
+        <p:nvCxnSpPr>
+          <p:cNvPr id="16" name="Straight Connector 15"/>
+          <p:cNvCxnSpPr/>
+          <p:nvPr/>
+        </p:nvCxnSpPr>
+        <p:spPr>
+          <a:xfrm>
+            <a:off x="235677" y="276999"/>
+            <a:ext cx="307199" cy="0"/>
+          </a:xfrm>
+          <a:prstGeom prst="line">
+            <a:avLst/>
+          </a:prstGeom>
+        </p:spPr>
+        <p:style>
+          <a:lnRef idx="1">
+            <a:schemeClr val="dk1"/>
+          </a:lnRef>
+          <a:fillRef idx="0">
+            <a:schemeClr val="dk1"/>
+          </a:fillRef>
+          <a:effectRef idx="0">
+            <a:schemeClr val="dk1"/>
+          </a:effectRef>
+          <a:fontRef idx="minor">
+            <a:schemeClr val="tx1"/>
+          </a:fontRef>
+        </p:style>
+      </p:cxnSp>
+      <p:pic>
+        <p:nvPicPr>
+          <p:cNvPr id="8" name="Picture 7"/>
+          <p:cNvPicPr>
+            <a:picLocks noChangeAspect="1"/>
+          </p:cNvPicPr>
+          <p:nvPr/>
+        </p:nvPicPr>
+        <p:blipFill rotWithShape="1">
+          <a:blip r:embed="rId3">
+            <a:extLst>
+              <a:ext uri="{28A0092B-C50C-407E-A947-70E740481C1C}">
+                <a14:useLocalDpi xmlns:a14="http://schemas.microsoft.com/office/drawing/2010/main" val="0"/>
+              </a:ext>
+            </a:extLst>
+          </a:blip>
+          <a:srcRect l="22800" t="19028" r="10510" b="16647"/>
+          <a:stretch/>
+        </p:blipFill>
+        <p:spPr>
+          <a:xfrm>
+            <a:off x="1180860" y="866474"/>
+            <a:ext cx="9176084" cy="4611128"/>
+          </a:xfrm>
+          <a:prstGeom prst="rect">
+            <a:avLst/>
+          </a:prstGeom>
+        </p:spPr>
+      </p:pic>
+    </p:spTree>
+    <p:extLst>
+      <p:ext uri="{BB962C8B-B14F-4D97-AF65-F5344CB8AC3E}">
+        <p14:creationId xmlns:p14="http://schemas.microsoft.com/office/powerpoint/2010/main" val="3285115805"/>
+      </p:ext>
+    </p:extLst>
+  </p:cSld>
+  <p:clrMapOvr>
+    <a:masterClrMapping/>
+  </p:clrMapOvr>
+  <p:timing>
+    <p:tnLst>
+      <p:par>
+        <p:cTn id="1" dur="indefinite" restart="never" nodeType="tmRoot"/>
+      </p:par>
+    </p:tnLst>
+  </p:timing>
+</p:sld>
+</file>
+
+<file path=ppt/slides/slide7.xml><?xml version="1.0" encoding="utf-8"?>
+<p:sld xmlns:a="http://schemas.openxmlformats.org/drawingml/2006/main" xmlns:r="http://schemas.openxmlformats.org/officeDocument/2006/relationships" xmlns:p="http://schemas.openxmlformats.org/presentationml/2006/main">
+  <p:cSld>
+    <p:spTree>
+      <p:nvGrpSpPr>
+        <p:cNvPr id="1" name=""/>
+        <p:cNvGrpSpPr/>
+        <p:nvPr/>
+      </p:nvGrpSpPr>
+      <p:grpSpPr>
+        <a:xfrm>
+          <a:off x="0" y="0"/>
+          <a:ext cx="0" cy="0"/>
+          <a:chOff x="0" y="0"/>
+          <a:chExt cx="0" cy="0"/>
+        </a:xfrm>
+      </p:grpSpPr>
+      <p:sp>
+        <p:nvSpPr>
+          <p:cNvPr id="4" name="Slide Number Placeholder 3"/>
+          <p:cNvSpPr>
+            <a:spLocks noGrp="1"/>
+          </p:cNvSpPr>
+          <p:nvPr>
+            <p:ph type="sldNum" sz="quarter" idx="12"/>
+          </p:nvPr>
+        </p:nvSpPr>
+        <p:spPr>
+          <a:xfrm>
+            <a:off x="9306059" y="6438513"/>
+            <a:ext cx="2743200" cy="365125"/>
+          </a:xfrm>
+        </p:spPr>
+        <p:txBody>
+          <a:bodyPr/>
+          <a:lstStyle/>
+          <a:p>
+            <a:fld id="{27225834-A5F4-4780-A9FC-586FB30F9BB0}" type="slidenum">
+              <a:rPr lang="en-US" smtClean="0">
+                <a:latin typeface="Garamond" panose="02020404030301010803" pitchFamily="18" charset="0"/>
+              </a:rPr>
+              <a:t>7</a:t>
             </a:fld>
             <a:endParaRPr lang="en-US" dirty="0">
               <a:latin typeface="Garamond" panose="02020404030301010803" pitchFamily="18" charset="0"/>
@@ -8517,7 +9957,7 @@
 </p:sld>
 </file>
 
-<file path=ppt/slides/slide6.xml><?xml version="1.0" encoding="utf-8"?>
+<file path=ppt/slides/slide8.xml><?xml version="1.0" encoding="utf-8"?>
 <p:sld xmlns:a="http://schemas.openxmlformats.org/drawingml/2006/main" xmlns:r="http://schemas.openxmlformats.org/officeDocument/2006/relationships" xmlns:p="http://schemas.openxmlformats.org/presentationml/2006/main">
   <p:cSld>
     <p:spTree>
@@ -8558,7 +9998,7 @@
               <a:rPr lang="en-US" smtClean="0">
                 <a:latin typeface="Garamond" panose="02020404030301010803" pitchFamily="18" charset="0"/>
               </a:rPr>
-              <a:t>6</a:t>
+              <a:t>8</a:t>
             </a:fld>
             <a:endParaRPr lang="en-US" dirty="0">
               <a:latin typeface="Garamond" panose="02020404030301010803" pitchFamily="18" charset="0"/>
@@ -8646,8 +10086,8 @@
         </p:nvSpPr>
         <p:spPr>
           <a:xfrm>
-            <a:off x="7111720" y="-1359296"/>
-            <a:ext cx="6490448" cy="923330"/>
+            <a:off x="372373" y="486568"/>
+            <a:ext cx="6490448" cy="646331"/>
           </a:xfrm>
           <a:prstGeom prst="rect">
             <a:avLst/>
@@ -8662,323 +10102,8 @@
           <a:p>
             <a:r>
               <a:rPr lang="en-US" dirty="0" smtClean="0"/>
-              <a:t>To insert: </a:t>
-            </a:r>
-          </a:p>
-          <a:p>
-            <a:r>
-              <a:rPr lang="en-US" dirty="0" smtClean="0"/>
-              <a:t>Quarter section – CAD </a:t>
-            </a:r>
-          </a:p>
-          <a:p>
-            <a:r>
-              <a:rPr lang="en-US" dirty="0" smtClean="0"/>
-              <a:t>Photo of the pump w/ casing – High Res</a:t>
-            </a:r>
-          </a:p>
-        </p:txBody>
-      </p:sp>
-      <p:sp>
-        <p:nvSpPr>
-          <p:cNvPr id="15" name="TextBox 14"/>
-          <p:cNvSpPr txBox="1"/>
-          <p:nvPr/>
-        </p:nvSpPr>
-        <p:spPr>
-          <a:xfrm>
-            <a:off x="-545432" y="-2169825"/>
-            <a:ext cx="7339263" cy="2031325"/>
-          </a:xfrm>
-          <a:prstGeom prst="rect">
-            <a:avLst/>
-          </a:prstGeom>
-          <a:noFill/>
-        </p:spPr>
-        <p:txBody>
-          <a:bodyPr wrap="square" rtlCol="0">
-            <a:spAutoFit/>
-          </a:bodyPr>
-          <a:lstStyle/>
-          <a:p>
-            <a:r>
-              <a:rPr lang="en-US" dirty="0" smtClean="0"/>
-              <a:t>Notes:</a:t>
-            </a:r>
-          </a:p>
-          <a:p>
-            <a:r>
-              <a:rPr lang="en-US" dirty="0" smtClean="0"/>
-              <a:t>Subsystem breakdown:</a:t>
-            </a:r>
-          </a:p>
-          <a:p>
-            <a:r>
-              <a:rPr lang="en-US" dirty="0" smtClean="0"/>
-              <a:t>Pump:</a:t>
-            </a:r>
-          </a:p>
-          <a:p>
-            <a:pPr lvl="1"/>
-            <a:r>
-              <a:rPr lang="en-US" dirty="0" smtClean="0"/>
-              <a:t>Bearing system</a:t>
-            </a:r>
-          </a:p>
-          <a:p>
-            <a:pPr lvl="1"/>
-            <a:r>
-              <a:rPr lang="en-US" dirty="0" smtClean="0"/>
-              <a:t>Seal system </a:t>
-            </a:r>
-          </a:p>
-          <a:p>
-            <a:pPr lvl="1"/>
-            <a:r>
-              <a:rPr lang="en-US" dirty="0" smtClean="0"/>
-              <a:t>Hydraulic system ( volute, impeller, diffuser) – highlight modular design</a:t>
-            </a:r>
-          </a:p>
-          <a:p>
-            <a:pPr lvl="1"/>
-            <a:r>
-              <a:rPr lang="en-US" dirty="0" smtClean="0"/>
-              <a:t>Shaft </a:t>
-            </a:r>
-          </a:p>
-        </p:txBody>
-      </p:sp>
-      <p:cxnSp>
-        <p:nvCxnSpPr>
-          <p:cNvPr id="16" name="Straight Connector 15"/>
-          <p:cNvCxnSpPr/>
-          <p:nvPr/>
-        </p:nvCxnSpPr>
-        <p:spPr>
-          <a:xfrm>
-            <a:off x="235677" y="276999"/>
-            <a:ext cx="307199" cy="0"/>
-          </a:xfrm>
-          <a:prstGeom prst="line">
-            <a:avLst/>
-          </a:prstGeom>
-        </p:spPr>
-        <p:style>
-          <a:lnRef idx="1">
-            <a:schemeClr val="dk1"/>
-          </a:lnRef>
-          <a:fillRef idx="0">
-            <a:schemeClr val="dk1"/>
-          </a:fillRef>
-          <a:effectRef idx="0">
-            <a:schemeClr val="dk1"/>
-          </a:effectRef>
-          <a:fontRef idx="minor">
-            <a:schemeClr val="tx1"/>
-          </a:fontRef>
-        </p:style>
-      </p:cxnSp>
-      <p:pic>
-        <p:nvPicPr>
-          <p:cNvPr id="8" name="Picture 7"/>
-          <p:cNvPicPr>
-            <a:picLocks noChangeAspect="1"/>
-          </p:cNvPicPr>
-          <p:nvPr/>
-        </p:nvPicPr>
-        <p:blipFill rotWithShape="1">
-          <a:blip r:embed="rId3">
-            <a:extLst>
-              <a:ext uri="{28A0092B-C50C-407E-A947-70E740481C1C}">
-                <a14:useLocalDpi xmlns:a14="http://schemas.microsoft.com/office/drawing/2010/main" val="0"/>
-              </a:ext>
-            </a:extLst>
-          </a:blip>
-          <a:srcRect l="22800" t="19028" r="10510" b="16647"/>
-          <a:stretch/>
-        </p:blipFill>
-        <p:spPr>
-          <a:xfrm>
-            <a:off x="1180860" y="866474"/>
-            <a:ext cx="9176084" cy="4611128"/>
-          </a:xfrm>
-          <a:prstGeom prst="rect">
-            <a:avLst/>
-          </a:prstGeom>
-        </p:spPr>
-      </p:pic>
-    </p:spTree>
-    <p:extLst>
-      <p:ext uri="{BB962C8B-B14F-4D97-AF65-F5344CB8AC3E}">
-        <p14:creationId xmlns:p14="http://schemas.microsoft.com/office/powerpoint/2010/main" val="3285115805"/>
-      </p:ext>
-    </p:extLst>
-  </p:cSld>
-  <p:clrMapOvr>
-    <a:masterClrMapping/>
-  </p:clrMapOvr>
-  <p:timing>
-    <p:tnLst>
-      <p:par>
-        <p:cTn id="1" dur="indefinite" restart="never" nodeType="tmRoot"/>
-      </p:par>
-    </p:tnLst>
-  </p:timing>
-</p:sld>
-</file>
-
-<file path=ppt/slides/slide7.xml><?xml version="1.0" encoding="utf-8"?>
-<p:sld xmlns:a="http://schemas.openxmlformats.org/drawingml/2006/main" xmlns:r="http://schemas.openxmlformats.org/officeDocument/2006/relationships" xmlns:p="http://schemas.openxmlformats.org/presentationml/2006/main">
-  <p:cSld>
-    <p:spTree>
-      <p:nvGrpSpPr>
-        <p:cNvPr id="1" name=""/>
-        <p:cNvGrpSpPr/>
-        <p:nvPr/>
-      </p:nvGrpSpPr>
-      <p:grpSpPr>
-        <a:xfrm>
-          <a:off x="0" y="0"/>
-          <a:ext cx="0" cy="0"/>
-          <a:chOff x="0" y="0"/>
-          <a:chExt cx="0" cy="0"/>
-        </a:xfrm>
-      </p:grpSpPr>
-      <p:sp>
-        <p:nvSpPr>
-          <p:cNvPr id="4" name="Slide Number Placeholder 3"/>
-          <p:cNvSpPr>
-            <a:spLocks noGrp="1"/>
-          </p:cNvSpPr>
-          <p:nvPr>
-            <p:ph type="sldNum" sz="quarter" idx="12"/>
-          </p:nvPr>
-        </p:nvSpPr>
-        <p:spPr>
-          <a:xfrm>
-            <a:off x="9306059" y="6438513"/>
-            <a:ext cx="2743200" cy="365125"/>
-          </a:xfrm>
-        </p:spPr>
-        <p:txBody>
-          <a:bodyPr/>
-          <a:lstStyle/>
-          <a:p>
-            <a:fld id="{27225834-A5F4-4780-A9FC-586FB30F9BB0}" type="slidenum">
-              <a:rPr lang="en-US" smtClean="0">
-                <a:latin typeface="Garamond" panose="02020404030301010803" pitchFamily="18" charset="0"/>
-              </a:rPr>
-              <a:t>7</a:t>
-            </a:fld>
-            <a:endParaRPr lang="en-US" dirty="0">
-              <a:latin typeface="Garamond" panose="02020404030301010803" pitchFamily="18" charset="0"/>
-            </a:endParaRPr>
-          </a:p>
-        </p:txBody>
-      </p:sp>
-      <p:sp>
-        <p:nvSpPr>
-          <p:cNvPr id="19" name="TextBox 18"/>
-          <p:cNvSpPr txBox="1"/>
-          <p:nvPr/>
-        </p:nvSpPr>
-        <p:spPr>
-          <a:xfrm>
-            <a:off x="128788" y="6482577"/>
-            <a:ext cx="4201920" cy="276999"/>
-          </a:xfrm>
-          <a:prstGeom prst="rect">
-            <a:avLst/>
-          </a:prstGeom>
-          <a:noFill/>
-        </p:spPr>
-        <p:txBody>
-          <a:bodyPr wrap="none" rtlCol="0">
-            <a:spAutoFit/>
-          </a:bodyPr>
-          <a:lstStyle/>
-          <a:p>
-            <a:r>
-              <a:rPr lang="en-US" sz="1200" dirty="0" smtClean="0">
-                <a:latin typeface="Garamond" panose="02020404030301010803" pitchFamily="18" charset="0"/>
-                <a:cs typeface="Times New Roman" panose="02020603050405020304" pitchFamily="18" charset="0"/>
-              </a:rPr>
-              <a:t>Portland State Aerospace Society | Electric Propellant Feed System</a:t>
-            </a:r>
-            <a:endParaRPr lang="en-US" sz="1200" dirty="0">
-              <a:latin typeface="Garamond" panose="02020404030301010803" pitchFamily="18" charset="0"/>
-              <a:cs typeface="Times New Roman" panose="02020603050405020304" pitchFamily="18" charset="0"/>
-            </a:endParaRPr>
-          </a:p>
-        </p:txBody>
-      </p:sp>
-      <p:sp>
-        <p:nvSpPr>
-          <p:cNvPr id="5" name="TextBox 4"/>
-          <p:cNvSpPr txBox="1"/>
-          <p:nvPr/>
-        </p:nvSpPr>
-        <p:spPr>
-          <a:xfrm>
-            <a:off x="128788" y="0"/>
-            <a:ext cx="1685077" cy="276999"/>
-          </a:xfrm>
-          <a:prstGeom prst="rect">
-            <a:avLst/>
-          </a:prstGeom>
-          <a:noFill/>
-        </p:spPr>
-        <p:txBody>
-          <a:bodyPr wrap="none" rtlCol="0">
-            <a:spAutoFit/>
-          </a:bodyPr>
-          <a:lstStyle/>
-          <a:p>
-            <a:r>
-              <a:rPr lang="en-US" sz="1200" dirty="0" smtClean="0">
-                <a:latin typeface="Garamond" panose="02020404030301010803" pitchFamily="18" charset="0"/>
-                <a:cs typeface="Times New Roman" panose="02020603050405020304" pitchFamily="18" charset="0"/>
-              </a:rPr>
-              <a:t>Final Design: Subsystem </a:t>
-            </a:r>
-            <a:endParaRPr lang="en-US" sz="1200" dirty="0">
-              <a:latin typeface="Garamond" panose="02020404030301010803" pitchFamily="18" charset="0"/>
-              <a:cs typeface="Times New Roman" panose="02020603050405020304" pitchFamily="18" charset="0"/>
-            </a:endParaRPr>
-          </a:p>
-        </p:txBody>
-      </p:sp>
-      <p:sp>
-        <p:nvSpPr>
-          <p:cNvPr id="13" name="TextBox 12"/>
-          <p:cNvSpPr txBox="1"/>
-          <p:nvPr/>
-        </p:nvSpPr>
-        <p:spPr>
-          <a:xfrm>
-            <a:off x="372373" y="486568"/>
-            <a:ext cx="6490448" cy="646331"/>
-          </a:xfrm>
-          <a:prstGeom prst="rect">
-            <a:avLst/>
-          </a:prstGeom>
-          <a:noFill/>
-        </p:spPr>
-        <p:txBody>
-          <a:bodyPr wrap="square" rtlCol="0">
-            <a:spAutoFit/>
-          </a:bodyPr>
-          <a:lstStyle/>
-          <a:p>
-            <a:r>
-              <a:rPr lang="en-US" dirty="0" smtClean="0"/>
-              <a:t>Motor </a:t>
-            </a:r>
-            <a:r>
-              <a:rPr lang="en-US" dirty="0" smtClean="0"/>
-              <a:t>Dynamometer Mount </a:t>
-            </a:r>
-            <a:endParaRPr lang="en-US" dirty="0" smtClean="0"/>
+              <a:t>Motor Dynamometer Mount </a:t>
+            </a:r>
           </a:p>
           <a:p>
             <a:endParaRPr lang="en-US" dirty="0" smtClean="0"/>
@@ -9170,7 +10295,7 @@
 </p:sld>
 </file>
 
-<file path=ppt/slides/slide8.xml><?xml version="1.0" encoding="utf-8"?>
+<file path=ppt/slides/slide9.xml><?xml version="1.0" encoding="utf-8"?>
 <p:sld xmlns:a="http://schemas.openxmlformats.org/drawingml/2006/main" xmlns:r="http://schemas.openxmlformats.org/officeDocument/2006/relationships" xmlns:p="http://schemas.openxmlformats.org/presentationml/2006/main">
   <p:cSld>
     <p:spTree>
@@ -9257,7 +10382,7 @@
               <a:rPr lang="en-US" smtClean="0">
                 <a:latin typeface="Garamond" panose="02020404030301010803" pitchFamily="18" charset="0"/>
               </a:rPr>
-              <a:t>8</a:t>
+              <a:t>9</a:t>
             </a:fld>
             <a:endParaRPr lang="en-US" dirty="0">
               <a:latin typeface="Garamond" panose="02020404030301010803" pitchFamily="18" charset="0"/>
@@ -9658,308 +10783,6 @@
     <p:extLst>
       <p:ext uri="{BB962C8B-B14F-4D97-AF65-F5344CB8AC3E}">
         <p14:creationId xmlns:p14="http://schemas.microsoft.com/office/powerpoint/2010/main" val="318833847"/>
-      </p:ext>
-    </p:extLst>
-  </p:cSld>
-  <p:clrMapOvr>
-    <a:masterClrMapping/>
-  </p:clrMapOvr>
-  <p:timing>
-    <p:tnLst>
-      <p:par>
-        <p:cTn id="1" dur="indefinite" restart="never" nodeType="tmRoot"/>
-      </p:par>
-    </p:tnLst>
-  </p:timing>
-</p:sld>
-</file>
-
-<file path=ppt/slides/slide9.xml><?xml version="1.0" encoding="utf-8"?>
-<p:sld xmlns:a="http://schemas.openxmlformats.org/drawingml/2006/main" xmlns:r="http://schemas.openxmlformats.org/officeDocument/2006/relationships" xmlns:p="http://schemas.openxmlformats.org/presentationml/2006/main">
-  <p:cSld>
-    <p:spTree>
-      <p:nvGrpSpPr>
-        <p:cNvPr id="1" name=""/>
-        <p:cNvGrpSpPr/>
-        <p:nvPr/>
-      </p:nvGrpSpPr>
-      <p:grpSpPr>
-        <a:xfrm>
-          <a:off x="0" y="0"/>
-          <a:ext cx="0" cy="0"/>
-          <a:chOff x="0" y="0"/>
-          <a:chExt cx="0" cy="0"/>
-        </a:xfrm>
-      </p:grpSpPr>
-      <p:sp>
-        <p:nvSpPr>
-          <p:cNvPr id="4" name="Slide Number Placeholder 3"/>
-          <p:cNvSpPr>
-            <a:spLocks noGrp="1"/>
-          </p:cNvSpPr>
-          <p:nvPr>
-            <p:ph type="sldNum" sz="quarter" idx="12"/>
-          </p:nvPr>
-        </p:nvSpPr>
-        <p:spPr>
-          <a:xfrm>
-            <a:off x="9306059" y="6438513"/>
-            <a:ext cx="2743200" cy="365125"/>
-          </a:xfrm>
-        </p:spPr>
-        <p:txBody>
-          <a:bodyPr/>
-          <a:lstStyle/>
-          <a:p>
-            <a:fld id="{27225834-A5F4-4780-A9FC-586FB30F9BB0}" type="slidenum">
-              <a:rPr lang="en-US" smtClean="0">
-                <a:latin typeface="Garamond" panose="02020404030301010803" pitchFamily="18" charset="0"/>
-              </a:rPr>
-              <a:t>9</a:t>
-            </a:fld>
-            <a:endParaRPr lang="en-US" dirty="0">
-              <a:latin typeface="Garamond" panose="02020404030301010803" pitchFamily="18" charset="0"/>
-            </a:endParaRPr>
-          </a:p>
-        </p:txBody>
-      </p:sp>
-      <p:sp>
-        <p:nvSpPr>
-          <p:cNvPr id="19" name="TextBox 18"/>
-          <p:cNvSpPr txBox="1"/>
-          <p:nvPr/>
-        </p:nvSpPr>
-        <p:spPr>
-          <a:xfrm>
-            <a:off x="128788" y="6482577"/>
-            <a:ext cx="4201920" cy="276999"/>
-          </a:xfrm>
-          <a:prstGeom prst="rect">
-            <a:avLst/>
-          </a:prstGeom>
-          <a:noFill/>
-        </p:spPr>
-        <p:txBody>
-          <a:bodyPr wrap="none" rtlCol="0">
-            <a:spAutoFit/>
-          </a:bodyPr>
-          <a:lstStyle/>
-          <a:p>
-            <a:r>
-              <a:rPr lang="en-US" sz="1200" dirty="0" smtClean="0">
-                <a:latin typeface="Garamond" panose="02020404030301010803" pitchFamily="18" charset="0"/>
-                <a:cs typeface="Times New Roman" panose="02020603050405020304" pitchFamily="18" charset="0"/>
-              </a:rPr>
-              <a:t>Portland State Aerospace Society | Electric Propellant Feed System</a:t>
-            </a:r>
-            <a:endParaRPr lang="en-US" sz="1200" dirty="0">
-              <a:latin typeface="Garamond" panose="02020404030301010803" pitchFamily="18" charset="0"/>
-              <a:cs typeface="Times New Roman" panose="02020603050405020304" pitchFamily="18" charset="0"/>
-            </a:endParaRPr>
-          </a:p>
-        </p:txBody>
-      </p:sp>
-      <p:sp>
-        <p:nvSpPr>
-          <p:cNvPr id="5" name="TextBox 4"/>
-          <p:cNvSpPr txBox="1"/>
-          <p:nvPr/>
-        </p:nvSpPr>
-        <p:spPr>
-          <a:xfrm>
-            <a:off x="128788" y="0"/>
-            <a:ext cx="1685077" cy="276999"/>
-          </a:xfrm>
-          <a:prstGeom prst="rect">
-            <a:avLst/>
-          </a:prstGeom>
-          <a:noFill/>
-        </p:spPr>
-        <p:txBody>
-          <a:bodyPr wrap="none" rtlCol="0">
-            <a:spAutoFit/>
-          </a:bodyPr>
-          <a:lstStyle/>
-          <a:p>
-            <a:r>
-              <a:rPr lang="en-US" sz="1200" dirty="0" smtClean="0">
-                <a:latin typeface="Garamond" panose="02020404030301010803" pitchFamily="18" charset="0"/>
-                <a:cs typeface="Times New Roman" panose="02020603050405020304" pitchFamily="18" charset="0"/>
-              </a:rPr>
-              <a:t>Final Design: Subsystem </a:t>
-            </a:r>
-            <a:endParaRPr lang="en-US" sz="1200" dirty="0">
-              <a:latin typeface="Garamond" panose="02020404030301010803" pitchFamily="18" charset="0"/>
-              <a:cs typeface="Times New Roman" panose="02020603050405020304" pitchFamily="18" charset="0"/>
-            </a:endParaRPr>
-          </a:p>
-        </p:txBody>
-      </p:sp>
-      <p:sp>
-        <p:nvSpPr>
-          <p:cNvPr id="13" name="TextBox 12"/>
-          <p:cNvSpPr txBox="1"/>
-          <p:nvPr/>
-        </p:nvSpPr>
-        <p:spPr>
-          <a:xfrm>
-            <a:off x="7603250" y="138499"/>
-            <a:ext cx="6490448" cy="1200329"/>
-          </a:xfrm>
-          <a:prstGeom prst="rect">
-            <a:avLst/>
-          </a:prstGeom>
-          <a:noFill/>
-        </p:spPr>
-        <p:txBody>
-          <a:bodyPr wrap="square" rtlCol="0">
-            <a:spAutoFit/>
-          </a:bodyPr>
-          <a:lstStyle/>
-          <a:p>
-            <a:r>
-              <a:rPr lang="en-US" dirty="0" smtClean="0"/>
-              <a:t>To insert: </a:t>
-            </a:r>
-          </a:p>
-          <a:p>
-            <a:r>
-              <a:rPr lang="en-US" dirty="0" smtClean="0"/>
-              <a:t>Flow diagram of testing apparatus – Diagram</a:t>
-            </a:r>
-          </a:p>
-          <a:p>
-            <a:r>
-              <a:rPr lang="en-US" dirty="0" smtClean="0"/>
-              <a:t>Photo of the testing apparatus – high res photo</a:t>
-            </a:r>
-          </a:p>
-          <a:p>
-            <a:r>
-              <a:rPr lang="en-US" dirty="0" smtClean="0"/>
-              <a:t>Photo of DAQ / measurement / harness</a:t>
-            </a:r>
-          </a:p>
-        </p:txBody>
-      </p:sp>
-      <p:sp>
-        <p:nvSpPr>
-          <p:cNvPr id="15" name="TextBox 14"/>
-          <p:cNvSpPr txBox="1"/>
-          <p:nvPr/>
-        </p:nvSpPr>
-        <p:spPr>
-          <a:xfrm>
-            <a:off x="0" y="553998"/>
-            <a:ext cx="7339263" cy="2308324"/>
-          </a:xfrm>
-          <a:prstGeom prst="rect">
-            <a:avLst/>
-          </a:prstGeom>
-          <a:noFill/>
-        </p:spPr>
-        <p:txBody>
-          <a:bodyPr wrap="square" rtlCol="0">
-            <a:spAutoFit/>
-          </a:bodyPr>
-          <a:lstStyle/>
-          <a:p>
-            <a:r>
-              <a:rPr lang="en-US" dirty="0" smtClean="0"/>
-              <a:t>Notes:</a:t>
-            </a:r>
-          </a:p>
-          <a:p>
-            <a:r>
-              <a:rPr lang="en-US" dirty="0" smtClean="0"/>
-              <a:t>Subsystem breakdown:</a:t>
-            </a:r>
-          </a:p>
-          <a:p>
-            <a:r>
-              <a:rPr lang="en-US" dirty="0" smtClean="0"/>
-              <a:t>Testing Apparatus:</a:t>
-            </a:r>
-          </a:p>
-          <a:p>
-            <a:pPr lvl="1"/>
-            <a:r>
-              <a:rPr lang="en-US" dirty="0" smtClean="0"/>
-              <a:t>Tank, suction line, discharge, experimental procedure, cooling </a:t>
-            </a:r>
-          </a:p>
-          <a:p>
-            <a:pPr lvl="1"/>
-            <a:r>
-              <a:rPr lang="en-US" dirty="0" smtClean="0"/>
-              <a:t>Sensing </a:t>
-            </a:r>
-          </a:p>
-          <a:p>
-            <a:pPr lvl="1"/>
-            <a:r>
-              <a:rPr lang="en-US" dirty="0"/>
-              <a:t>	</a:t>
-            </a:r>
-            <a:r>
-              <a:rPr lang="en-US" dirty="0" smtClean="0"/>
-              <a:t>Pressure, flow, RPM, Torque</a:t>
-            </a:r>
-          </a:p>
-          <a:p>
-            <a:pPr lvl="1"/>
-            <a:r>
-              <a:rPr lang="en-US" dirty="0" smtClean="0"/>
-              <a:t>Data Acquisition</a:t>
-            </a:r>
-          </a:p>
-          <a:p>
-            <a:pPr lvl="1"/>
-            <a:r>
-              <a:rPr lang="en-US" dirty="0"/>
-              <a:t>	</a:t>
-            </a:r>
-            <a:r>
-              <a:rPr lang="en-US" dirty="0" smtClean="0"/>
-              <a:t>Arduino to excel </a:t>
-            </a:r>
-          </a:p>
-        </p:txBody>
-      </p:sp>
-      <p:cxnSp>
-        <p:nvCxnSpPr>
-          <p:cNvPr id="16" name="Straight Connector 15"/>
-          <p:cNvCxnSpPr/>
-          <p:nvPr/>
-        </p:nvCxnSpPr>
-        <p:spPr>
-          <a:xfrm>
-            <a:off x="235677" y="276999"/>
-            <a:ext cx="307199" cy="0"/>
-          </a:xfrm>
-          <a:prstGeom prst="line">
-            <a:avLst/>
-          </a:prstGeom>
-        </p:spPr>
-        <p:style>
-          <a:lnRef idx="1">
-            <a:schemeClr val="dk1"/>
-          </a:lnRef>
-          <a:fillRef idx="0">
-            <a:schemeClr val="dk1"/>
-          </a:fillRef>
-          <a:effectRef idx="0">
-            <a:schemeClr val="dk1"/>
-          </a:effectRef>
-          <a:fontRef idx="minor">
-            <a:schemeClr val="tx1"/>
-          </a:fontRef>
-        </p:style>
-      </p:cxnSp>
-    </p:spTree>
-    <p:extLst>
-      <p:ext uri="{BB962C8B-B14F-4D97-AF65-F5344CB8AC3E}">
-        <p14:creationId xmlns:p14="http://schemas.microsoft.com/office/powerpoint/2010/main" val="1989979975"/>
       </p:ext>
     </p:extLst>
   </p:cSld>

</xml_diff>